<commit_message>
update 01e and 01f
</commit_message>
<xml_diff>
--- a/notebooks/01f_SmithChart_example1.pptx
+++ b/notebooks/01f_SmithChart_example1.pptx
@@ -12,6 +12,8 @@
     <p:sldId id="269" r:id="rId6"/>
     <p:sldId id="271" r:id="rId7"/>
     <p:sldId id="272" r:id="rId8"/>
+    <p:sldId id="273" r:id="rId9"/>
+    <p:sldId id="274" r:id="rId10"/>
   </p:sldIdLst>
   <p:sldSz cx="9144000" cy="6858000" type="screen4x3"/>
   <p:notesSz cx="6858000" cy="9144000"/>
@@ -7261,6 +7263,2250 @@
     <p:extLst>
       <p:ext uri="{BB962C8B-B14F-4D97-AF65-F5344CB8AC3E}">
         <p14:creationId xmlns:p14="http://schemas.microsoft.com/office/powerpoint/2010/main" val="101218846"/>
+      </p:ext>
+    </p:extLst>
+  </p:cSld>
+  <p:clrMapOvr>
+    <a:masterClrMapping/>
+  </p:clrMapOvr>
+  <p:timing>
+    <p:tnLst>
+      <p:par>
+        <p:cTn xmlns:p14="http://schemas.microsoft.com/office/powerpoint/2010/main" id="1" dur="indefinite" restart="never" nodeType="tmRoot"/>
+      </p:par>
+    </p:tnLst>
+  </p:timing>
+</p:sld>
+</file>
+
+<file path=ppt/slides/slide8.xml><?xml version="1.0" encoding="utf-8"?>
+<p:sld xmlns:a="http://schemas.openxmlformats.org/drawingml/2006/main" xmlns:r="http://schemas.openxmlformats.org/officeDocument/2006/relationships" xmlns:p="http://schemas.openxmlformats.org/presentationml/2006/main">
+  <p:cSld>
+    <p:spTree>
+      <p:nvGrpSpPr>
+        <p:cNvPr id="1" name=""/>
+        <p:cNvGrpSpPr/>
+        <p:nvPr/>
+      </p:nvGrpSpPr>
+      <p:grpSpPr>
+        <a:xfrm>
+          <a:off x="0" y="0"/>
+          <a:ext cx="0" cy="0"/>
+          <a:chOff x="0" y="0"/>
+          <a:chExt cx="0" cy="0"/>
+        </a:xfrm>
+      </p:grpSpPr>
+      <p:grpSp>
+        <p:nvGrpSpPr>
+          <p:cNvPr id="8" name="Group 7"/>
+          <p:cNvGrpSpPr/>
+          <p:nvPr/>
+        </p:nvGrpSpPr>
+        <p:grpSpPr>
+          <a:xfrm>
+            <a:off x="1071933" y="-970415"/>
+            <a:ext cx="7419110" cy="9601200"/>
+            <a:chOff x="1071933" y="-970415"/>
+            <a:chExt cx="7419110" cy="9601200"/>
+          </a:xfrm>
+        </p:grpSpPr>
+        <p:pic>
+          <p:nvPicPr>
+            <p:cNvPr id="4" name="Picture 3" descr="SmithChart.pdf"/>
+            <p:cNvPicPr>
+              <a:picLocks noChangeAspect="1"/>
+            </p:cNvPicPr>
+            <p:nvPr/>
+          </p:nvPicPr>
+          <p:blipFill>
+            <a:blip r:embed="rId2">
+              <a:extLst>
+                <a:ext uri="{28A0092B-C50C-407E-A947-70E740481C1C}">
+                  <a14:useLocalDpi xmlns:a14="http://schemas.microsoft.com/office/drawing/2010/main" val="0"/>
+                </a:ext>
+              </a:extLst>
+            </a:blip>
+            <a:stretch>
+              <a:fillRect/>
+            </a:stretch>
+          </p:blipFill>
+          <p:spPr>
+            <a:xfrm>
+              <a:off x="1071933" y="-970415"/>
+              <a:ext cx="7419110" cy="9601200"/>
+            </a:xfrm>
+            <a:prstGeom prst="rect">
+              <a:avLst/>
+            </a:prstGeom>
+          </p:spPr>
+        </p:pic>
+        <p:sp>
+          <p:nvSpPr>
+            <p:cNvPr id="5" name="Rectangle 4"/>
+            <p:cNvSpPr/>
+            <p:nvPr/>
+          </p:nvSpPr>
+          <p:spPr>
+            <a:xfrm>
+              <a:off x="7585201" y="5206073"/>
+              <a:ext cx="732207" cy="1663369"/>
+            </a:xfrm>
+            <a:prstGeom prst="rect">
+              <a:avLst/>
+            </a:prstGeom>
+            <a:solidFill>
+              <a:schemeClr val="bg1"/>
+            </a:solidFill>
+            <a:ln>
+              <a:noFill/>
+            </a:ln>
+            <a:effectLst/>
+          </p:spPr>
+          <p:style>
+            <a:lnRef idx="1">
+              <a:schemeClr val="accent1"/>
+            </a:lnRef>
+            <a:fillRef idx="3">
+              <a:schemeClr val="accent1"/>
+            </a:fillRef>
+            <a:effectRef idx="2">
+              <a:schemeClr val="accent1"/>
+            </a:effectRef>
+            <a:fontRef idx="minor">
+              <a:schemeClr val="lt1"/>
+            </a:fontRef>
+          </p:style>
+          <p:txBody>
+            <a:bodyPr rtlCol="0" anchor="ctr"/>
+            <a:lstStyle/>
+            <a:p>
+              <a:pPr algn="ctr"/>
+              <a:endParaRPr lang="en-US"/>
+            </a:p>
+          </p:txBody>
+        </p:sp>
+        <p:sp>
+          <p:nvSpPr>
+            <p:cNvPr id="6" name="Rectangle 5"/>
+            <p:cNvSpPr/>
+            <p:nvPr/>
+          </p:nvSpPr>
+          <p:spPr>
+            <a:xfrm>
+              <a:off x="1071933" y="5206073"/>
+              <a:ext cx="888101" cy="1663369"/>
+            </a:xfrm>
+            <a:prstGeom prst="rect">
+              <a:avLst/>
+            </a:prstGeom>
+            <a:solidFill>
+              <a:schemeClr val="bg1"/>
+            </a:solidFill>
+            <a:ln>
+              <a:noFill/>
+            </a:ln>
+            <a:effectLst/>
+          </p:spPr>
+          <p:style>
+            <a:lnRef idx="1">
+              <a:schemeClr val="accent1"/>
+            </a:lnRef>
+            <a:fillRef idx="3">
+              <a:schemeClr val="accent1"/>
+            </a:fillRef>
+            <a:effectRef idx="2">
+              <a:schemeClr val="accent1"/>
+            </a:effectRef>
+            <a:fontRef idx="minor">
+              <a:schemeClr val="lt1"/>
+            </a:fontRef>
+          </p:style>
+          <p:txBody>
+            <a:bodyPr rtlCol="0" anchor="ctr"/>
+            <a:lstStyle/>
+            <a:p>
+              <a:pPr algn="ctr"/>
+              <a:endParaRPr lang="en-US"/>
+            </a:p>
+          </p:txBody>
+        </p:sp>
+      </p:grpSp>
+      <p:sp>
+        <p:nvSpPr>
+          <p:cNvPr id="9" name="Oval 8"/>
+          <p:cNvSpPr/>
+          <p:nvPr/>
+        </p:nvSpPr>
+        <p:spPr>
+          <a:xfrm>
+            <a:off x="4622829" y="1866121"/>
+            <a:ext cx="88122" cy="88122"/>
+          </a:xfrm>
+          <a:prstGeom prst="ellipse">
+            <a:avLst/>
+          </a:prstGeom>
+          <a:solidFill>
+            <a:srgbClr val="FF0000"/>
+          </a:solidFill>
+          <a:ln>
+            <a:solidFill>
+              <a:schemeClr val="tx1"/>
+            </a:solidFill>
+          </a:ln>
+          <a:effectLst/>
+        </p:spPr>
+        <p:style>
+          <a:lnRef idx="1">
+            <a:schemeClr val="accent1"/>
+          </a:lnRef>
+          <a:fillRef idx="3">
+            <a:schemeClr val="accent1"/>
+          </a:fillRef>
+          <a:effectRef idx="2">
+            <a:schemeClr val="accent1"/>
+          </a:effectRef>
+          <a:fontRef idx="minor">
+            <a:schemeClr val="lt1"/>
+          </a:fontRef>
+        </p:style>
+        <p:txBody>
+          <a:bodyPr rtlCol="0" anchor="ctr"/>
+          <a:lstStyle/>
+          <a:p>
+            <a:pPr algn="ctr"/>
+            <a:endParaRPr lang="en-US"/>
+          </a:p>
+        </p:txBody>
+      </p:sp>
+      <p:sp>
+        <p:nvSpPr>
+          <p:cNvPr id="10" name="TextBox 9"/>
+          <p:cNvSpPr txBox="1"/>
+          <p:nvPr/>
+        </p:nvSpPr>
+        <p:spPr>
+          <a:xfrm>
+            <a:off x="3094247" y="1709363"/>
+            <a:ext cx="1454244" cy="369332"/>
+          </a:xfrm>
+          <a:prstGeom prst="rect">
+            <a:avLst/>
+          </a:prstGeom>
+          <a:solidFill>
+            <a:srgbClr val="FFFFFF"/>
+          </a:solidFill>
+        </p:spPr>
+        <p:txBody>
+          <a:bodyPr wrap="none" rtlCol="0">
+            <a:spAutoFit/>
+          </a:bodyPr>
+          <a:lstStyle/>
+          <a:p>
+            <a:r>
+              <a:rPr lang="en-US" dirty="0" err="1" smtClean="0">
+                <a:solidFill>
+                  <a:srgbClr val="FF0000"/>
+                </a:solidFill>
+              </a:rPr>
+              <a:t>z</a:t>
+            </a:r>
+            <a:r>
+              <a:rPr lang="en-US" baseline="-25000" dirty="0" err="1" smtClean="0">
+                <a:solidFill>
+                  <a:srgbClr val="FF0000"/>
+                </a:solidFill>
+              </a:rPr>
+              <a:t>L</a:t>
+            </a:r>
+            <a:r>
+              <a:rPr lang="en-US" dirty="0" smtClean="0">
+                <a:solidFill>
+                  <a:srgbClr val="FF0000"/>
+                </a:solidFill>
+              </a:rPr>
+              <a:t> = 0.5 + j0.8</a:t>
+            </a:r>
+            <a:endParaRPr lang="en-US" dirty="0">
+              <a:solidFill>
+                <a:srgbClr val="FF0000"/>
+              </a:solidFill>
+            </a:endParaRPr>
+          </a:p>
+        </p:txBody>
+      </p:sp>
+      <p:sp>
+        <p:nvSpPr>
+          <p:cNvPr id="12" name="TextBox 11"/>
+          <p:cNvSpPr txBox="1"/>
+          <p:nvPr/>
+        </p:nvSpPr>
+        <p:spPr>
+          <a:xfrm>
+            <a:off x="4778996" y="82115"/>
+            <a:ext cx="720607" cy="369332"/>
+          </a:xfrm>
+          <a:prstGeom prst="rect">
+            <a:avLst/>
+          </a:prstGeom>
+          <a:solidFill>
+            <a:srgbClr val="FFFFFF"/>
+          </a:solidFill>
+        </p:spPr>
+        <p:txBody>
+          <a:bodyPr wrap="none" rtlCol="0">
+            <a:spAutoFit/>
+          </a:bodyPr>
+          <a:lstStyle/>
+          <a:p>
+            <a:r>
+              <a:rPr lang="en-US" dirty="0" smtClean="0">
+                <a:solidFill>
+                  <a:srgbClr val="FF0000"/>
+                </a:solidFill>
+              </a:rPr>
+              <a:t>0.12</a:t>
+            </a:r>
+            <a:r>
+              <a:rPr lang="en-US" dirty="0" smtClean="0">
+                <a:solidFill>
+                  <a:srgbClr val="FF0000"/>
+                </a:solidFill>
+                <a:latin typeface="Symbol" charset="2"/>
+                <a:cs typeface="Symbol" charset="2"/>
+              </a:rPr>
+              <a:t>l</a:t>
+            </a:r>
+            <a:endParaRPr lang="en-US" dirty="0">
+              <a:solidFill>
+                <a:srgbClr val="FF0000"/>
+              </a:solidFill>
+            </a:endParaRPr>
+          </a:p>
+        </p:txBody>
+      </p:sp>
+      <p:sp>
+        <p:nvSpPr>
+          <p:cNvPr id="13" name="Arc 12"/>
+          <p:cNvSpPr/>
+          <p:nvPr/>
+        </p:nvSpPr>
+        <p:spPr>
+          <a:xfrm>
+            <a:off x="3208131" y="1899196"/>
+            <a:ext cx="3143511" cy="3203342"/>
+          </a:xfrm>
+          <a:prstGeom prst="arc">
+            <a:avLst>
+              <a:gd name="adj1" fmla="val 15897266"/>
+              <a:gd name="adj2" fmla="val 10548614"/>
+            </a:avLst>
+          </a:prstGeom>
+          <a:noFill/>
+          <a:ln>
+            <a:solidFill>
+              <a:srgbClr val="FF0000"/>
+            </a:solidFill>
+          </a:ln>
+          <a:effectLst/>
+        </p:spPr>
+        <p:style>
+          <a:lnRef idx="2">
+            <a:schemeClr val="accent1"/>
+          </a:lnRef>
+          <a:fillRef idx="0">
+            <a:schemeClr val="accent1"/>
+          </a:fillRef>
+          <a:effectRef idx="1">
+            <a:schemeClr val="accent1"/>
+          </a:effectRef>
+          <a:fontRef idx="minor">
+            <a:schemeClr val="tx1"/>
+          </a:fontRef>
+        </p:style>
+        <p:txBody>
+          <a:bodyPr rtlCol="0" anchor="ctr"/>
+          <a:lstStyle/>
+          <a:p>
+            <a:pPr algn="ctr"/>
+            <a:endParaRPr lang="en-US"/>
+          </a:p>
+        </p:txBody>
+      </p:sp>
+      <p:cxnSp>
+        <p:nvCxnSpPr>
+          <p:cNvPr id="11" name="Straight Connector 10"/>
+          <p:cNvCxnSpPr/>
+          <p:nvPr/>
+        </p:nvCxnSpPr>
+        <p:spPr>
+          <a:xfrm flipH="1" flipV="1">
+            <a:off x="4548491" y="82115"/>
+            <a:ext cx="230507" cy="3399576"/>
+          </a:xfrm>
+          <a:prstGeom prst="line">
+            <a:avLst/>
+          </a:prstGeom>
+          <a:ln>
+            <a:solidFill>
+              <a:srgbClr val="FF0000"/>
+            </a:solidFill>
+            <a:prstDash val="sysDash"/>
+          </a:ln>
+          <a:effectLst/>
+        </p:spPr>
+        <p:style>
+          <a:lnRef idx="2">
+            <a:schemeClr val="accent1"/>
+          </a:lnRef>
+          <a:fillRef idx="0">
+            <a:schemeClr val="accent1"/>
+          </a:fillRef>
+          <a:effectRef idx="1">
+            <a:schemeClr val="accent1"/>
+          </a:effectRef>
+          <a:fontRef idx="minor">
+            <a:schemeClr val="tx1"/>
+          </a:fontRef>
+        </p:style>
+      </p:cxnSp>
+      <p:sp>
+        <p:nvSpPr>
+          <p:cNvPr id="14" name="TextBox 13"/>
+          <p:cNvSpPr txBox="1"/>
+          <p:nvPr/>
+        </p:nvSpPr>
+        <p:spPr>
+          <a:xfrm>
+            <a:off x="1960034" y="2992912"/>
+            <a:ext cx="1543136" cy="369332"/>
+          </a:xfrm>
+          <a:prstGeom prst="rect">
+            <a:avLst/>
+          </a:prstGeom>
+          <a:solidFill>
+            <a:srgbClr val="FFFFFF"/>
+          </a:solidFill>
+        </p:spPr>
+        <p:txBody>
+          <a:bodyPr wrap="none" rtlCol="0">
+            <a:spAutoFit/>
+          </a:bodyPr>
+          <a:lstStyle/>
+          <a:p>
+            <a:r>
+              <a:rPr lang="en-US" dirty="0" err="1" smtClean="0">
+                <a:solidFill>
+                  <a:srgbClr val="FF0000"/>
+                </a:solidFill>
+              </a:rPr>
+              <a:t>z</a:t>
+            </a:r>
+            <a:r>
+              <a:rPr lang="en-US" baseline="-25000" dirty="0" err="1" smtClean="0">
+                <a:solidFill>
+                  <a:srgbClr val="FF0000"/>
+                </a:solidFill>
+              </a:rPr>
+              <a:t>in</a:t>
+            </a:r>
+            <a:r>
+              <a:rPr lang="en-US" dirty="0" smtClean="0">
+                <a:solidFill>
+                  <a:srgbClr val="FF0000"/>
+                </a:solidFill>
+              </a:rPr>
+              <a:t> </a:t>
+            </a:r>
+            <a:r>
+              <a:rPr lang="en-US" dirty="0" smtClean="0">
+                <a:solidFill>
+                  <a:srgbClr val="FF0000"/>
+                </a:solidFill>
+              </a:rPr>
+              <a:t>= </a:t>
+            </a:r>
+            <a:r>
+              <a:rPr lang="en-US" dirty="0" smtClean="0">
+                <a:solidFill>
+                  <a:srgbClr val="FF0000"/>
+                </a:solidFill>
+              </a:rPr>
+              <a:t>0.3 </a:t>
+            </a:r>
+            <a:r>
+              <a:rPr lang="en-US" dirty="0">
+                <a:solidFill>
+                  <a:srgbClr val="FF0000"/>
+                </a:solidFill>
+              </a:rPr>
+              <a:t>-</a:t>
+            </a:r>
+            <a:r>
+              <a:rPr lang="en-US" dirty="0" smtClean="0">
+                <a:solidFill>
+                  <a:srgbClr val="FF0000"/>
+                </a:solidFill>
+              </a:rPr>
+              <a:t> j0.05</a:t>
+            </a:r>
+            <a:endParaRPr lang="en-US" dirty="0">
+              <a:solidFill>
+                <a:srgbClr val="FF0000"/>
+              </a:solidFill>
+            </a:endParaRPr>
+          </a:p>
+        </p:txBody>
+      </p:sp>
+      <p:sp>
+        <p:nvSpPr>
+          <p:cNvPr id="15" name="TextBox 14"/>
+          <p:cNvSpPr txBox="1"/>
+          <p:nvPr/>
+        </p:nvSpPr>
+        <p:spPr>
+          <a:xfrm>
+            <a:off x="463775" y="2623580"/>
+            <a:ext cx="964289" cy="923330"/>
+          </a:xfrm>
+          <a:prstGeom prst="rect">
+            <a:avLst/>
+          </a:prstGeom>
+          <a:solidFill>
+            <a:srgbClr val="FFFFFF"/>
+          </a:solidFill>
+        </p:spPr>
+        <p:txBody>
+          <a:bodyPr wrap="none" rtlCol="0">
+            <a:spAutoFit/>
+          </a:bodyPr>
+          <a:lstStyle/>
+          <a:p>
+            <a:r>
+              <a:rPr lang="en-US" dirty="0" smtClean="0">
+                <a:solidFill>
+                  <a:srgbClr val="FF0000"/>
+                </a:solidFill>
+              </a:rPr>
+              <a:t>  0.12</a:t>
+            </a:r>
+            <a:r>
+              <a:rPr lang="en-US" dirty="0" smtClean="0">
+                <a:solidFill>
+                  <a:srgbClr val="FF0000"/>
+                </a:solidFill>
+                <a:latin typeface="Symbol" charset="2"/>
+                <a:cs typeface="Symbol" charset="2"/>
+              </a:rPr>
+              <a:t>l</a:t>
+            </a:r>
+          </a:p>
+          <a:p>
+            <a:r>
+              <a:rPr lang="en-US" dirty="0" smtClean="0">
+                <a:solidFill>
+                  <a:srgbClr val="FF0000"/>
+                </a:solidFill>
+              </a:rPr>
+              <a:t>+0.375</a:t>
+            </a:r>
+            <a:r>
+              <a:rPr lang="en-US" dirty="0" smtClean="0">
+                <a:solidFill>
+                  <a:srgbClr val="FF0000"/>
+                </a:solidFill>
+                <a:latin typeface="Symbol" charset="2"/>
+                <a:cs typeface="Symbol" charset="2"/>
+              </a:rPr>
+              <a:t>l</a:t>
+            </a:r>
+          </a:p>
+          <a:p>
+            <a:r>
+              <a:rPr lang="en-US" dirty="0" smtClean="0">
+                <a:solidFill>
+                  <a:srgbClr val="FF0000"/>
+                </a:solidFill>
+                <a:latin typeface="Symbol" charset="2"/>
+                <a:cs typeface="Symbol" charset="2"/>
+              </a:rPr>
+              <a:t>=</a:t>
+            </a:r>
+            <a:r>
+              <a:rPr lang="en-US" dirty="0" smtClean="0">
+                <a:solidFill>
+                  <a:srgbClr val="FF0000"/>
+                </a:solidFill>
+              </a:rPr>
+              <a:t>0.495</a:t>
+            </a:r>
+            <a:r>
+              <a:rPr lang="en-US" dirty="0" smtClean="0">
+                <a:solidFill>
+                  <a:srgbClr val="FF0000"/>
+                </a:solidFill>
+                <a:latin typeface="Symbol" charset="2"/>
+                <a:cs typeface="Symbol" charset="2"/>
+              </a:rPr>
+              <a:t>l</a:t>
+            </a:r>
+            <a:endParaRPr lang="en-US" dirty="0">
+              <a:solidFill>
+                <a:srgbClr val="FF0000"/>
+              </a:solidFill>
+            </a:endParaRPr>
+          </a:p>
+        </p:txBody>
+      </p:sp>
+      <p:cxnSp>
+        <p:nvCxnSpPr>
+          <p:cNvPr id="16" name="Straight Connector 15"/>
+          <p:cNvCxnSpPr/>
+          <p:nvPr/>
+        </p:nvCxnSpPr>
+        <p:spPr>
+          <a:xfrm flipH="1">
+            <a:off x="1190647" y="3481691"/>
+            <a:ext cx="3588352" cy="229269"/>
+          </a:xfrm>
+          <a:prstGeom prst="line">
+            <a:avLst/>
+          </a:prstGeom>
+          <a:ln>
+            <a:solidFill>
+              <a:srgbClr val="FF0000"/>
+            </a:solidFill>
+            <a:prstDash val="sysDash"/>
+          </a:ln>
+          <a:effectLst/>
+        </p:spPr>
+        <p:style>
+          <a:lnRef idx="2">
+            <a:schemeClr val="accent1"/>
+          </a:lnRef>
+          <a:fillRef idx="0">
+            <a:schemeClr val="accent1"/>
+          </a:fillRef>
+          <a:effectRef idx="1">
+            <a:schemeClr val="accent1"/>
+          </a:effectRef>
+          <a:fontRef idx="minor">
+            <a:schemeClr val="tx1"/>
+          </a:fontRef>
+        </p:style>
+      </p:cxnSp>
+      <p:sp>
+        <p:nvSpPr>
+          <p:cNvPr id="17" name="Oval 16"/>
+          <p:cNvSpPr/>
+          <p:nvPr/>
+        </p:nvSpPr>
+        <p:spPr>
+          <a:xfrm>
+            <a:off x="3164070" y="3521426"/>
+            <a:ext cx="88122" cy="88122"/>
+          </a:xfrm>
+          <a:prstGeom prst="ellipse">
+            <a:avLst/>
+          </a:prstGeom>
+          <a:solidFill>
+            <a:srgbClr val="FF0000"/>
+          </a:solidFill>
+          <a:ln>
+            <a:solidFill>
+              <a:schemeClr val="tx1"/>
+            </a:solidFill>
+          </a:ln>
+          <a:effectLst/>
+        </p:spPr>
+        <p:style>
+          <a:lnRef idx="1">
+            <a:schemeClr val="accent1"/>
+          </a:lnRef>
+          <a:fillRef idx="3">
+            <a:schemeClr val="accent1"/>
+          </a:fillRef>
+          <a:effectRef idx="2">
+            <a:schemeClr val="accent1"/>
+          </a:effectRef>
+          <a:fontRef idx="minor">
+            <a:schemeClr val="lt1"/>
+          </a:fontRef>
+        </p:style>
+        <p:txBody>
+          <a:bodyPr rtlCol="0" anchor="ctr"/>
+          <a:lstStyle/>
+          <a:p>
+            <a:pPr algn="ctr"/>
+            <a:endParaRPr lang="en-US"/>
+          </a:p>
+        </p:txBody>
+      </p:sp>
+      <p:cxnSp>
+        <p:nvCxnSpPr>
+          <p:cNvPr id="19" name="Straight Connector 18"/>
+          <p:cNvCxnSpPr/>
+          <p:nvPr/>
+        </p:nvCxnSpPr>
+        <p:spPr>
+          <a:xfrm>
+            <a:off x="535791" y="3241302"/>
+            <a:ext cx="767305" cy="0"/>
+          </a:xfrm>
+          <a:prstGeom prst="line">
+            <a:avLst/>
+          </a:prstGeom>
+          <a:ln>
+            <a:solidFill>
+              <a:srgbClr val="FF0000"/>
+            </a:solidFill>
+          </a:ln>
+          <a:effectLst/>
+        </p:spPr>
+        <p:style>
+          <a:lnRef idx="2">
+            <a:schemeClr val="accent1"/>
+          </a:lnRef>
+          <a:fillRef idx="0">
+            <a:schemeClr val="accent1"/>
+          </a:fillRef>
+          <a:effectRef idx="1">
+            <a:schemeClr val="accent1"/>
+          </a:effectRef>
+          <a:fontRef idx="minor">
+            <a:schemeClr val="tx1"/>
+          </a:fontRef>
+        </p:style>
+      </p:cxnSp>
+      <p:sp>
+        <p:nvSpPr>
+          <p:cNvPr id="18" name="TextBox 17"/>
+          <p:cNvSpPr txBox="1"/>
+          <p:nvPr/>
+        </p:nvSpPr>
+        <p:spPr>
+          <a:xfrm>
+            <a:off x="300365" y="5021407"/>
+            <a:ext cx="1710725" cy="646331"/>
+          </a:xfrm>
+          <a:prstGeom prst="rect">
+            <a:avLst/>
+          </a:prstGeom>
+          <a:solidFill>
+            <a:srgbClr val="FFFFFF"/>
+          </a:solidFill>
+        </p:spPr>
+        <p:txBody>
+          <a:bodyPr wrap="none" rtlCol="0">
+            <a:spAutoFit/>
+          </a:bodyPr>
+          <a:lstStyle/>
+          <a:p>
+            <a:r>
+              <a:rPr lang="en-US" dirty="0" err="1">
+                <a:solidFill>
+                  <a:srgbClr val="FF0000"/>
+                </a:solidFill>
+              </a:rPr>
+              <a:t>Z</a:t>
+            </a:r>
+            <a:r>
+              <a:rPr lang="en-US" baseline="-25000" dirty="0" err="1" smtClean="0">
+                <a:solidFill>
+                  <a:srgbClr val="FF0000"/>
+                </a:solidFill>
+              </a:rPr>
+              <a:t>in</a:t>
+            </a:r>
+            <a:r>
+              <a:rPr lang="en-US" dirty="0" smtClean="0">
+                <a:solidFill>
+                  <a:srgbClr val="FF0000"/>
+                </a:solidFill>
+              </a:rPr>
+              <a:t> </a:t>
+            </a:r>
+            <a:r>
+              <a:rPr lang="en-US" dirty="0" smtClean="0">
+                <a:solidFill>
+                  <a:srgbClr val="FF0000"/>
+                </a:solidFill>
+              </a:rPr>
+              <a:t>= </a:t>
+            </a:r>
+            <a:r>
+              <a:rPr lang="en-US" dirty="0" smtClean="0">
+                <a:solidFill>
+                  <a:srgbClr val="FF0000"/>
+                </a:solidFill>
+              </a:rPr>
+              <a:t>Z</a:t>
+            </a:r>
+            <a:r>
+              <a:rPr lang="en-US" baseline="-25000" dirty="0" smtClean="0">
+                <a:solidFill>
+                  <a:srgbClr val="FF0000"/>
+                </a:solidFill>
+              </a:rPr>
+              <a:t>0</a:t>
+            </a:r>
+            <a:r>
+              <a:rPr lang="en-US" dirty="0" smtClean="0">
+                <a:solidFill>
+                  <a:srgbClr val="FF0000"/>
+                </a:solidFill>
+              </a:rPr>
+              <a:t>z</a:t>
+            </a:r>
+            <a:r>
+              <a:rPr lang="en-US" baseline="-25000" dirty="0" smtClean="0">
+                <a:solidFill>
+                  <a:srgbClr val="FF0000"/>
+                </a:solidFill>
+              </a:rPr>
+              <a:t>in</a:t>
+            </a:r>
+          </a:p>
+          <a:p>
+            <a:r>
+              <a:rPr lang="en-US" dirty="0" smtClean="0">
+                <a:solidFill>
+                  <a:srgbClr val="FF0000"/>
+                </a:solidFill>
+              </a:rPr>
+              <a:t>     = 15 </a:t>
+            </a:r>
+            <a:r>
+              <a:rPr lang="en-US" dirty="0">
+                <a:solidFill>
+                  <a:srgbClr val="FF0000"/>
+                </a:solidFill>
+              </a:rPr>
+              <a:t>-</a:t>
+            </a:r>
+            <a:r>
+              <a:rPr lang="en-US" dirty="0" smtClean="0">
+                <a:solidFill>
+                  <a:srgbClr val="FF0000"/>
+                </a:solidFill>
+              </a:rPr>
+              <a:t> j0.25 </a:t>
+            </a:r>
+            <a:r>
+              <a:rPr lang="en-US" dirty="0" smtClean="0">
+                <a:solidFill>
+                  <a:srgbClr val="FF0000"/>
+                </a:solidFill>
+                <a:latin typeface="Symbol" charset="2"/>
+                <a:cs typeface="Symbol" charset="2"/>
+              </a:rPr>
+              <a:t>W</a:t>
+            </a:r>
+            <a:endParaRPr lang="en-US" dirty="0">
+              <a:solidFill>
+                <a:srgbClr val="FF0000"/>
+              </a:solidFill>
+              <a:latin typeface="Symbol" charset="2"/>
+              <a:cs typeface="Symbol" charset="2"/>
+            </a:endParaRPr>
+          </a:p>
+        </p:txBody>
+      </p:sp>
+      <p:sp>
+        <p:nvSpPr>
+          <p:cNvPr id="20" name="TextBox 19"/>
+          <p:cNvSpPr txBox="1"/>
+          <p:nvPr/>
+        </p:nvSpPr>
+        <p:spPr>
+          <a:xfrm>
+            <a:off x="6415090" y="3601296"/>
+            <a:ext cx="1263988" cy="369332"/>
+          </a:xfrm>
+          <a:prstGeom prst="rect">
+            <a:avLst/>
+          </a:prstGeom>
+          <a:solidFill>
+            <a:srgbClr val="FFFFFF"/>
+          </a:solidFill>
+        </p:spPr>
+        <p:txBody>
+          <a:bodyPr wrap="none" rtlCol="0">
+            <a:spAutoFit/>
+          </a:bodyPr>
+          <a:lstStyle/>
+          <a:p>
+            <a:r>
+              <a:rPr lang="en-US" dirty="0" smtClean="0">
+                <a:solidFill>
+                  <a:srgbClr val="FF0000"/>
+                </a:solidFill>
+              </a:rPr>
+              <a:t>VSWR = 3.5</a:t>
+            </a:r>
+            <a:endParaRPr lang="en-US" dirty="0">
+              <a:solidFill>
+                <a:srgbClr val="FF0000"/>
+              </a:solidFill>
+            </a:endParaRPr>
+          </a:p>
+        </p:txBody>
+      </p:sp>
+      <p:sp>
+        <p:nvSpPr>
+          <p:cNvPr id="21" name="Oval 20"/>
+          <p:cNvSpPr/>
+          <p:nvPr/>
+        </p:nvSpPr>
+        <p:spPr>
+          <a:xfrm>
+            <a:off x="6304753" y="3433304"/>
+            <a:ext cx="88122" cy="88122"/>
+          </a:xfrm>
+          <a:prstGeom prst="ellipse">
+            <a:avLst/>
+          </a:prstGeom>
+          <a:solidFill>
+            <a:srgbClr val="FF0000"/>
+          </a:solidFill>
+          <a:ln>
+            <a:solidFill>
+              <a:schemeClr val="tx1"/>
+            </a:solidFill>
+          </a:ln>
+          <a:effectLst/>
+        </p:spPr>
+        <p:style>
+          <a:lnRef idx="1">
+            <a:schemeClr val="accent1"/>
+          </a:lnRef>
+          <a:fillRef idx="3">
+            <a:schemeClr val="accent1"/>
+          </a:fillRef>
+          <a:effectRef idx="2">
+            <a:schemeClr val="accent1"/>
+          </a:effectRef>
+          <a:fontRef idx="minor">
+            <a:schemeClr val="lt1"/>
+          </a:fontRef>
+        </p:style>
+        <p:txBody>
+          <a:bodyPr rtlCol="0" anchor="ctr"/>
+          <a:lstStyle/>
+          <a:p>
+            <a:pPr algn="ctr"/>
+            <a:endParaRPr lang="en-US"/>
+          </a:p>
+        </p:txBody>
+      </p:sp>
+      <p:cxnSp>
+        <p:nvCxnSpPr>
+          <p:cNvPr id="25" name="Straight Connector 24"/>
+          <p:cNvCxnSpPr/>
+          <p:nvPr/>
+        </p:nvCxnSpPr>
+        <p:spPr>
+          <a:xfrm flipH="1">
+            <a:off x="4778999" y="3495178"/>
+            <a:ext cx="3804825" cy="0"/>
+          </a:xfrm>
+          <a:prstGeom prst="line">
+            <a:avLst/>
+          </a:prstGeom>
+          <a:ln>
+            <a:solidFill>
+              <a:srgbClr val="FF0000"/>
+            </a:solidFill>
+            <a:prstDash val="sysDash"/>
+          </a:ln>
+          <a:effectLst/>
+        </p:spPr>
+        <p:style>
+          <a:lnRef idx="2">
+            <a:schemeClr val="accent1"/>
+          </a:lnRef>
+          <a:fillRef idx="0">
+            <a:schemeClr val="accent1"/>
+          </a:fillRef>
+          <a:effectRef idx="1">
+            <a:schemeClr val="accent1"/>
+          </a:effectRef>
+          <a:fontRef idx="minor">
+            <a:schemeClr val="tx1"/>
+          </a:fontRef>
+        </p:style>
+      </p:cxnSp>
+      <p:sp>
+        <p:nvSpPr>
+          <p:cNvPr id="29" name="Arc 28"/>
+          <p:cNvSpPr/>
+          <p:nvPr/>
+        </p:nvSpPr>
+        <p:spPr>
+          <a:xfrm>
+            <a:off x="1303096" y="82115"/>
+            <a:ext cx="7014312" cy="6855257"/>
+          </a:xfrm>
+          <a:prstGeom prst="arc">
+            <a:avLst>
+              <a:gd name="adj1" fmla="val 15943104"/>
+              <a:gd name="adj2" fmla="val 0"/>
+            </a:avLst>
+          </a:prstGeom>
+          <a:ln w="12700" cmpd="sng">
+            <a:solidFill>
+              <a:srgbClr val="FF0000"/>
+            </a:solidFill>
+            <a:prstDash val="sysDash"/>
+            <a:headEnd type="none"/>
+            <a:tailEnd type="triangle"/>
+          </a:ln>
+          <a:effectLst/>
+        </p:spPr>
+        <p:style>
+          <a:lnRef idx="2">
+            <a:schemeClr val="accent1"/>
+          </a:lnRef>
+          <a:fillRef idx="0">
+            <a:schemeClr val="accent1"/>
+          </a:fillRef>
+          <a:effectRef idx="1">
+            <a:schemeClr val="accent1"/>
+          </a:effectRef>
+          <a:fontRef idx="minor">
+            <a:schemeClr val="tx1"/>
+          </a:fontRef>
+        </p:style>
+        <p:txBody>
+          <a:bodyPr rtlCol="0" anchor="ctr"/>
+          <a:lstStyle/>
+          <a:p>
+            <a:pPr algn="ctr"/>
+            <a:endParaRPr lang="en-US"/>
+          </a:p>
+        </p:txBody>
+      </p:sp>
+    </p:spTree>
+    <p:extLst>
+      <p:ext uri="{BB962C8B-B14F-4D97-AF65-F5344CB8AC3E}">
+        <p14:creationId xmlns:p14="http://schemas.microsoft.com/office/powerpoint/2010/main" val="4152098040"/>
+      </p:ext>
+    </p:extLst>
+  </p:cSld>
+  <p:clrMapOvr>
+    <a:masterClrMapping/>
+  </p:clrMapOvr>
+  <p:timing>
+    <p:tnLst>
+      <p:par>
+        <p:cTn xmlns:p14="http://schemas.microsoft.com/office/powerpoint/2010/main" id="1" dur="indefinite" restart="never" nodeType="tmRoot"/>
+      </p:par>
+    </p:tnLst>
+  </p:timing>
+</p:sld>
+</file>
+
+<file path=ppt/slides/slide9.xml><?xml version="1.0" encoding="utf-8"?>
+<p:sld xmlns:a="http://schemas.openxmlformats.org/drawingml/2006/main" xmlns:r="http://schemas.openxmlformats.org/officeDocument/2006/relationships" xmlns:p="http://schemas.openxmlformats.org/presentationml/2006/main">
+  <p:cSld>
+    <p:spTree>
+      <p:nvGrpSpPr>
+        <p:cNvPr id="1" name=""/>
+        <p:cNvGrpSpPr/>
+        <p:nvPr/>
+      </p:nvGrpSpPr>
+      <p:grpSpPr>
+        <a:xfrm>
+          <a:off x="0" y="0"/>
+          <a:ext cx="0" cy="0"/>
+          <a:chOff x="0" y="0"/>
+          <a:chExt cx="0" cy="0"/>
+        </a:xfrm>
+      </p:grpSpPr>
+      <p:grpSp>
+        <p:nvGrpSpPr>
+          <p:cNvPr id="8" name="Group 7"/>
+          <p:cNvGrpSpPr/>
+          <p:nvPr/>
+        </p:nvGrpSpPr>
+        <p:grpSpPr>
+          <a:xfrm>
+            <a:off x="1071933" y="-970415"/>
+            <a:ext cx="7419110" cy="9601200"/>
+            <a:chOff x="1071933" y="-970415"/>
+            <a:chExt cx="7419110" cy="9601200"/>
+          </a:xfrm>
+        </p:grpSpPr>
+        <p:pic>
+          <p:nvPicPr>
+            <p:cNvPr id="4" name="Picture 3" descr="SmithChart.pdf"/>
+            <p:cNvPicPr>
+              <a:picLocks noChangeAspect="1"/>
+            </p:cNvPicPr>
+            <p:nvPr/>
+          </p:nvPicPr>
+          <p:blipFill>
+            <a:blip r:embed="rId2">
+              <a:extLst>
+                <a:ext uri="{28A0092B-C50C-407E-A947-70E740481C1C}">
+                  <a14:useLocalDpi xmlns:a14="http://schemas.microsoft.com/office/drawing/2010/main" val="0"/>
+                </a:ext>
+              </a:extLst>
+            </a:blip>
+            <a:stretch>
+              <a:fillRect/>
+            </a:stretch>
+          </p:blipFill>
+          <p:spPr>
+            <a:xfrm>
+              <a:off x="1071933" y="-970415"/>
+              <a:ext cx="7419110" cy="9601200"/>
+            </a:xfrm>
+            <a:prstGeom prst="rect">
+              <a:avLst/>
+            </a:prstGeom>
+          </p:spPr>
+        </p:pic>
+        <p:sp>
+          <p:nvSpPr>
+            <p:cNvPr id="5" name="Rectangle 4"/>
+            <p:cNvSpPr/>
+            <p:nvPr/>
+          </p:nvSpPr>
+          <p:spPr>
+            <a:xfrm>
+              <a:off x="7585201" y="5206073"/>
+              <a:ext cx="732207" cy="1663369"/>
+            </a:xfrm>
+            <a:prstGeom prst="rect">
+              <a:avLst/>
+            </a:prstGeom>
+            <a:solidFill>
+              <a:schemeClr val="bg1"/>
+            </a:solidFill>
+            <a:ln>
+              <a:noFill/>
+            </a:ln>
+            <a:effectLst/>
+          </p:spPr>
+          <p:style>
+            <a:lnRef idx="1">
+              <a:schemeClr val="accent1"/>
+            </a:lnRef>
+            <a:fillRef idx="3">
+              <a:schemeClr val="accent1"/>
+            </a:fillRef>
+            <a:effectRef idx="2">
+              <a:schemeClr val="accent1"/>
+            </a:effectRef>
+            <a:fontRef idx="minor">
+              <a:schemeClr val="lt1"/>
+            </a:fontRef>
+          </p:style>
+          <p:txBody>
+            <a:bodyPr rtlCol="0" anchor="ctr"/>
+            <a:lstStyle/>
+            <a:p>
+              <a:pPr algn="ctr"/>
+              <a:endParaRPr lang="en-US"/>
+            </a:p>
+          </p:txBody>
+        </p:sp>
+        <p:sp>
+          <p:nvSpPr>
+            <p:cNvPr id="6" name="Rectangle 5"/>
+            <p:cNvSpPr/>
+            <p:nvPr/>
+          </p:nvSpPr>
+          <p:spPr>
+            <a:xfrm>
+              <a:off x="1071933" y="5206073"/>
+              <a:ext cx="888101" cy="1663369"/>
+            </a:xfrm>
+            <a:prstGeom prst="rect">
+              <a:avLst/>
+            </a:prstGeom>
+            <a:solidFill>
+              <a:schemeClr val="bg1"/>
+            </a:solidFill>
+            <a:ln>
+              <a:noFill/>
+            </a:ln>
+            <a:effectLst/>
+          </p:spPr>
+          <p:style>
+            <a:lnRef idx="1">
+              <a:schemeClr val="accent1"/>
+            </a:lnRef>
+            <a:fillRef idx="3">
+              <a:schemeClr val="accent1"/>
+            </a:fillRef>
+            <a:effectRef idx="2">
+              <a:schemeClr val="accent1"/>
+            </a:effectRef>
+            <a:fontRef idx="minor">
+              <a:schemeClr val="lt1"/>
+            </a:fontRef>
+          </p:style>
+          <p:txBody>
+            <a:bodyPr rtlCol="0" anchor="ctr"/>
+            <a:lstStyle/>
+            <a:p>
+              <a:pPr algn="ctr"/>
+              <a:endParaRPr lang="en-US"/>
+            </a:p>
+          </p:txBody>
+        </p:sp>
+      </p:grpSp>
+      <p:sp>
+        <p:nvSpPr>
+          <p:cNvPr id="9" name="Oval 8"/>
+          <p:cNvSpPr/>
+          <p:nvPr/>
+        </p:nvSpPr>
+        <p:spPr>
+          <a:xfrm>
+            <a:off x="4622829" y="1866121"/>
+            <a:ext cx="88122" cy="88122"/>
+          </a:xfrm>
+          <a:prstGeom prst="ellipse">
+            <a:avLst/>
+          </a:prstGeom>
+          <a:solidFill>
+            <a:srgbClr val="FF0000"/>
+          </a:solidFill>
+          <a:ln>
+            <a:solidFill>
+              <a:schemeClr val="tx1"/>
+            </a:solidFill>
+          </a:ln>
+          <a:effectLst/>
+        </p:spPr>
+        <p:style>
+          <a:lnRef idx="1">
+            <a:schemeClr val="accent1"/>
+          </a:lnRef>
+          <a:fillRef idx="3">
+            <a:schemeClr val="accent1"/>
+          </a:fillRef>
+          <a:effectRef idx="2">
+            <a:schemeClr val="accent1"/>
+          </a:effectRef>
+          <a:fontRef idx="minor">
+            <a:schemeClr val="lt1"/>
+          </a:fontRef>
+        </p:style>
+        <p:txBody>
+          <a:bodyPr rtlCol="0" anchor="ctr"/>
+          <a:lstStyle/>
+          <a:p>
+            <a:pPr algn="ctr"/>
+            <a:endParaRPr lang="en-US"/>
+          </a:p>
+        </p:txBody>
+      </p:sp>
+      <p:sp>
+        <p:nvSpPr>
+          <p:cNvPr id="10" name="TextBox 9"/>
+          <p:cNvSpPr txBox="1"/>
+          <p:nvPr/>
+        </p:nvSpPr>
+        <p:spPr>
+          <a:xfrm>
+            <a:off x="3094247" y="1709363"/>
+            <a:ext cx="1454244" cy="369332"/>
+          </a:xfrm>
+          <a:prstGeom prst="rect">
+            <a:avLst/>
+          </a:prstGeom>
+          <a:solidFill>
+            <a:srgbClr val="FFFFFF"/>
+          </a:solidFill>
+        </p:spPr>
+        <p:txBody>
+          <a:bodyPr wrap="none" rtlCol="0">
+            <a:spAutoFit/>
+          </a:bodyPr>
+          <a:lstStyle/>
+          <a:p>
+            <a:r>
+              <a:rPr lang="en-US" dirty="0" err="1" smtClean="0">
+                <a:solidFill>
+                  <a:srgbClr val="FF0000"/>
+                </a:solidFill>
+              </a:rPr>
+              <a:t>z</a:t>
+            </a:r>
+            <a:r>
+              <a:rPr lang="en-US" baseline="-25000" dirty="0" err="1" smtClean="0">
+                <a:solidFill>
+                  <a:srgbClr val="FF0000"/>
+                </a:solidFill>
+              </a:rPr>
+              <a:t>L</a:t>
+            </a:r>
+            <a:r>
+              <a:rPr lang="en-US" dirty="0" smtClean="0">
+                <a:solidFill>
+                  <a:srgbClr val="FF0000"/>
+                </a:solidFill>
+              </a:rPr>
+              <a:t> = 0.5 + j0.8</a:t>
+            </a:r>
+            <a:endParaRPr lang="en-US" dirty="0">
+              <a:solidFill>
+                <a:srgbClr val="FF0000"/>
+              </a:solidFill>
+            </a:endParaRPr>
+          </a:p>
+        </p:txBody>
+      </p:sp>
+      <p:sp>
+        <p:nvSpPr>
+          <p:cNvPr id="12" name="TextBox 11"/>
+          <p:cNvSpPr txBox="1"/>
+          <p:nvPr/>
+        </p:nvSpPr>
+        <p:spPr>
+          <a:xfrm>
+            <a:off x="4778996" y="82115"/>
+            <a:ext cx="720607" cy="369332"/>
+          </a:xfrm>
+          <a:prstGeom prst="rect">
+            <a:avLst/>
+          </a:prstGeom>
+          <a:solidFill>
+            <a:srgbClr val="FFFFFF"/>
+          </a:solidFill>
+        </p:spPr>
+        <p:txBody>
+          <a:bodyPr wrap="none" rtlCol="0">
+            <a:spAutoFit/>
+          </a:bodyPr>
+          <a:lstStyle/>
+          <a:p>
+            <a:r>
+              <a:rPr lang="en-US" dirty="0" smtClean="0">
+                <a:solidFill>
+                  <a:srgbClr val="FF0000"/>
+                </a:solidFill>
+              </a:rPr>
+              <a:t>0.12</a:t>
+            </a:r>
+            <a:r>
+              <a:rPr lang="en-US" dirty="0" smtClean="0">
+                <a:solidFill>
+                  <a:srgbClr val="FF0000"/>
+                </a:solidFill>
+                <a:latin typeface="Symbol" charset="2"/>
+                <a:cs typeface="Symbol" charset="2"/>
+              </a:rPr>
+              <a:t>l</a:t>
+            </a:r>
+            <a:endParaRPr lang="en-US" dirty="0">
+              <a:solidFill>
+                <a:srgbClr val="FF0000"/>
+              </a:solidFill>
+            </a:endParaRPr>
+          </a:p>
+        </p:txBody>
+      </p:sp>
+      <p:sp>
+        <p:nvSpPr>
+          <p:cNvPr id="13" name="Arc 12"/>
+          <p:cNvSpPr/>
+          <p:nvPr/>
+        </p:nvSpPr>
+        <p:spPr>
+          <a:xfrm>
+            <a:off x="3208131" y="1899196"/>
+            <a:ext cx="3143511" cy="3203342"/>
+          </a:xfrm>
+          <a:prstGeom prst="arc">
+            <a:avLst>
+              <a:gd name="adj1" fmla="val 15897266"/>
+              <a:gd name="adj2" fmla="val 10548614"/>
+            </a:avLst>
+          </a:prstGeom>
+          <a:noFill/>
+          <a:ln>
+            <a:solidFill>
+              <a:srgbClr val="FF0000"/>
+            </a:solidFill>
+          </a:ln>
+          <a:effectLst/>
+        </p:spPr>
+        <p:style>
+          <a:lnRef idx="2">
+            <a:schemeClr val="accent1"/>
+          </a:lnRef>
+          <a:fillRef idx="0">
+            <a:schemeClr val="accent1"/>
+          </a:fillRef>
+          <a:effectRef idx="1">
+            <a:schemeClr val="accent1"/>
+          </a:effectRef>
+          <a:fontRef idx="minor">
+            <a:schemeClr val="tx1"/>
+          </a:fontRef>
+        </p:style>
+        <p:txBody>
+          <a:bodyPr rtlCol="0" anchor="ctr"/>
+          <a:lstStyle/>
+          <a:p>
+            <a:pPr algn="ctr"/>
+            <a:endParaRPr lang="en-US"/>
+          </a:p>
+        </p:txBody>
+      </p:sp>
+      <p:cxnSp>
+        <p:nvCxnSpPr>
+          <p:cNvPr id="11" name="Straight Connector 10"/>
+          <p:cNvCxnSpPr/>
+          <p:nvPr/>
+        </p:nvCxnSpPr>
+        <p:spPr>
+          <a:xfrm flipH="1" flipV="1">
+            <a:off x="4548491" y="82115"/>
+            <a:ext cx="230507" cy="3399576"/>
+          </a:xfrm>
+          <a:prstGeom prst="line">
+            <a:avLst/>
+          </a:prstGeom>
+          <a:ln>
+            <a:solidFill>
+              <a:srgbClr val="FF0000"/>
+            </a:solidFill>
+            <a:prstDash val="sysDash"/>
+          </a:ln>
+          <a:effectLst/>
+        </p:spPr>
+        <p:style>
+          <a:lnRef idx="2">
+            <a:schemeClr val="accent1"/>
+          </a:lnRef>
+          <a:fillRef idx="0">
+            <a:schemeClr val="accent1"/>
+          </a:fillRef>
+          <a:effectRef idx="1">
+            <a:schemeClr val="accent1"/>
+          </a:effectRef>
+          <a:fontRef idx="minor">
+            <a:schemeClr val="tx1"/>
+          </a:fontRef>
+        </p:style>
+      </p:cxnSp>
+      <p:sp>
+        <p:nvSpPr>
+          <p:cNvPr id="14" name="TextBox 13"/>
+          <p:cNvSpPr txBox="1"/>
+          <p:nvPr/>
+        </p:nvSpPr>
+        <p:spPr>
+          <a:xfrm>
+            <a:off x="1960034" y="2992912"/>
+            <a:ext cx="1543136" cy="369332"/>
+          </a:xfrm>
+          <a:prstGeom prst="rect">
+            <a:avLst/>
+          </a:prstGeom>
+          <a:solidFill>
+            <a:srgbClr val="FFFFFF"/>
+          </a:solidFill>
+        </p:spPr>
+        <p:txBody>
+          <a:bodyPr wrap="none" rtlCol="0">
+            <a:spAutoFit/>
+          </a:bodyPr>
+          <a:lstStyle/>
+          <a:p>
+            <a:r>
+              <a:rPr lang="en-US" dirty="0" err="1" smtClean="0">
+                <a:solidFill>
+                  <a:srgbClr val="FF0000"/>
+                </a:solidFill>
+              </a:rPr>
+              <a:t>z</a:t>
+            </a:r>
+            <a:r>
+              <a:rPr lang="en-US" baseline="-25000" dirty="0" err="1" smtClean="0">
+                <a:solidFill>
+                  <a:srgbClr val="FF0000"/>
+                </a:solidFill>
+              </a:rPr>
+              <a:t>in</a:t>
+            </a:r>
+            <a:r>
+              <a:rPr lang="en-US" dirty="0" smtClean="0">
+                <a:solidFill>
+                  <a:srgbClr val="FF0000"/>
+                </a:solidFill>
+              </a:rPr>
+              <a:t> </a:t>
+            </a:r>
+            <a:r>
+              <a:rPr lang="en-US" dirty="0" smtClean="0">
+                <a:solidFill>
+                  <a:srgbClr val="FF0000"/>
+                </a:solidFill>
+              </a:rPr>
+              <a:t>= </a:t>
+            </a:r>
+            <a:r>
+              <a:rPr lang="en-US" dirty="0" smtClean="0">
+                <a:solidFill>
+                  <a:srgbClr val="FF0000"/>
+                </a:solidFill>
+              </a:rPr>
+              <a:t>0.3 </a:t>
+            </a:r>
+            <a:r>
+              <a:rPr lang="en-US" dirty="0">
+                <a:solidFill>
+                  <a:srgbClr val="FF0000"/>
+                </a:solidFill>
+              </a:rPr>
+              <a:t>-</a:t>
+            </a:r>
+            <a:r>
+              <a:rPr lang="en-US" dirty="0" smtClean="0">
+                <a:solidFill>
+                  <a:srgbClr val="FF0000"/>
+                </a:solidFill>
+              </a:rPr>
+              <a:t> j0.05</a:t>
+            </a:r>
+            <a:endParaRPr lang="en-US" dirty="0">
+              <a:solidFill>
+                <a:srgbClr val="FF0000"/>
+              </a:solidFill>
+            </a:endParaRPr>
+          </a:p>
+        </p:txBody>
+      </p:sp>
+      <p:sp>
+        <p:nvSpPr>
+          <p:cNvPr id="15" name="TextBox 14"/>
+          <p:cNvSpPr txBox="1"/>
+          <p:nvPr/>
+        </p:nvSpPr>
+        <p:spPr>
+          <a:xfrm>
+            <a:off x="463775" y="2623580"/>
+            <a:ext cx="964289" cy="923330"/>
+          </a:xfrm>
+          <a:prstGeom prst="rect">
+            <a:avLst/>
+          </a:prstGeom>
+          <a:solidFill>
+            <a:srgbClr val="FFFFFF"/>
+          </a:solidFill>
+        </p:spPr>
+        <p:txBody>
+          <a:bodyPr wrap="none" rtlCol="0">
+            <a:spAutoFit/>
+          </a:bodyPr>
+          <a:lstStyle/>
+          <a:p>
+            <a:r>
+              <a:rPr lang="en-US" dirty="0" smtClean="0">
+                <a:solidFill>
+                  <a:srgbClr val="FF0000"/>
+                </a:solidFill>
+              </a:rPr>
+              <a:t>  0.12</a:t>
+            </a:r>
+            <a:r>
+              <a:rPr lang="en-US" dirty="0" smtClean="0">
+                <a:solidFill>
+                  <a:srgbClr val="FF0000"/>
+                </a:solidFill>
+                <a:latin typeface="Symbol" charset="2"/>
+                <a:cs typeface="Symbol" charset="2"/>
+              </a:rPr>
+              <a:t>l</a:t>
+            </a:r>
+          </a:p>
+          <a:p>
+            <a:r>
+              <a:rPr lang="en-US" dirty="0" smtClean="0">
+                <a:solidFill>
+                  <a:srgbClr val="FF0000"/>
+                </a:solidFill>
+              </a:rPr>
+              <a:t>+0.375</a:t>
+            </a:r>
+            <a:r>
+              <a:rPr lang="en-US" dirty="0" smtClean="0">
+                <a:solidFill>
+                  <a:srgbClr val="FF0000"/>
+                </a:solidFill>
+                <a:latin typeface="Symbol" charset="2"/>
+                <a:cs typeface="Symbol" charset="2"/>
+              </a:rPr>
+              <a:t>l</a:t>
+            </a:r>
+          </a:p>
+          <a:p>
+            <a:r>
+              <a:rPr lang="en-US" dirty="0" smtClean="0">
+                <a:solidFill>
+                  <a:srgbClr val="FF0000"/>
+                </a:solidFill>
+                <a:latin typeface="Symbol" charset="2"/>
+                <a:cs typeface="Symbol" charset="2"/>
+              </a:rPr>
+              <a:t>=</a:t>
+            </a:r>
+            <a:r>
+              <a:rPr lang="en-US" dirty="0" smtClean="0">
+                <a:solidFill>
+                  <a:srgbClr val="FF0000"/>
+                </a:solidFill>
+              </a:rPr>
+              <a:t>0.495</a:t>
+            </a:r>
+            <a:r>
+              <a:rPr lang="en-US" dirty="0" smtClean="0">
+                <a:solidFill>
+                  <a:srgbClr val="FF0000"/>
+                </a:solidFill>
+                <a:latin typeface="Symbol" charset="2"/>
+                <a:cs typeface="Symbol" charset="2"/>
+              </a:rPr>
+              <a:t>l</a:t>
+            </a:r>
+            <a:endParaRPr lang="en-US" dirty="0">
+              <a:solidFill>
+                <a:srgbClr val="FF0000"/>
+              </a:solidFill>
+            </a:endParaRPr>
+          </a:p>
+        </p:txBody>
+      </p:sp>
+      <p:cxnSp>
+        <p:nvCxnSpPr>
+          <p:cNvPr id="16" name="Straight Connector 15"/>
+          <p:cNvCxnSpPr/>
+          <p:nvPr/>
+        </p:nvCxnSpPr>
+        <p:spPr>
+          <a:xfrm flipH="1">
+            <a:off x="1190647" y="3481691"/>
+            <a:ext cx="3588352" cy="229269"/>
+          </a:xfrm>
+          <a:prstGeom prst="line">
+            <a:avLst/>
+          </a:prstGeom>
+          <a:ln>
+            <a:solidFill>
+              <a:srgbClr val="FF0000"/>
+            </a:solidFill>
+            <a:prstDash val="sysDash"/>
+          </a:ln>
+          <a:effectLst/>
+        </p:spPr>
+        <p:style>
+          <a:lnRef idx="2">
+            <a:schemeClr val="accent1"/>
+          </a:lnRef>
+          <a:fillRef idx="0">
+            <a:schemeClr val="accent1"/>
+          </a:fillRef>
+          <a:effectRef idx="1">
+            <a:schemeClr val="accent1"/>
+          </a:effectRef>
+          <a:fontRef idx="minor">
+            <a:schemeClr val="tx1"/>
+          </a:fontRef>
+        </p:style>
+      </p:cxnSp>
+      <p:sp>
+        <p:nvSpPr>
+          <p:cNvPr id="17" name="Oval 16"/>
+          <p:cNvSpPr/>
+          <p:nvPr/>
+        </p:nvSpPr>
+        <p:spPr>
+          <a:xfrm>
+            <a:off x="3164070" y="3521426"/>
+            <a:ext cx="88122" cy="88122"/>
+          </a:xfrm>
+          <a:prstGeom prst="ellipse">
+            <a:avLst/>
+          </a:prstGeom>
+          <a:solidFill>
+            <a:srgbClr val="FF0000"/>
+          </a:solidFill>
+          <a:ln>
+            <a:solidFill>
+              <a:schemeClr val="tx1"/>
+            </a:solidFill>
+          </a:ln>
+          <a:effectLst/>
+        </p:spPr>
+        <p:style>
+          <a:lnRef idx="1">
+            <a:schemeClr val="accent1"/>
+          </a:lnRef>
+          <a:fillRef idx="3">
+            <a:schemeClr val="accent1"/>
+          </a:fillRef>
+          <a:effectRef idx="2">
+            <a:schemeClr val="accent1"/>
+          </a:effectRef>
+          <a:fontRef idx="minor">
+            <a:schemeClr val="lt1"/>
+          </a:fontRef>
+        </p:style>
+        <p:txBody>
+          <a:bodyPr rtlCol="0" anchor="ctr"/>
+          <a:lstStyle/>
+          <a:p>
+            <a:pPr algn="ctr"/>
+            <a:endParaRPr lang="en-US"/>
+          </a:p>
+        </p:txBody>
+      </p:sp>
+      <p:cxnSp>
+        <p:nvCxnSpPr>
+          <p:cNvPr id="19" name="Straight Connector 18"/>
+          <p:cNvCxnSpPr/>
+          <p:nvPr/>
+        </p:nvCxnSpPr>
+        <p:spPr>
+          <a:xfrm>
+            <a:off x="535791" y="3241302"/>
+            <a:ext cx="767305" cy="0"/>
+          </a:xfrm>
+          <a:prstGeom prst="line">
+            <a:avLst/>
+          </a:prstGeom>
+          <a:ln>
+            <a:solidFill>
+              <a:srgbClr val="FF0000"/>
+            </a:solidFill>
+          </a:ln>
+          <a:effectLst/>
+        </p:spPr>
+        <p:style>
+          <a:lnRef idx="2">
+            <a:schemeClr val="accent1"/>
+          </a:lnRef>
+          <a:fillRef idx="0">
+            <a:schemeClr val="accent1"/>
+          </a:fillRef>
+          <a:effectRef idx="1">
+            <a:schemeClr val="accent1"/>
+          </a:effectRef>
+          <a:fontRef idx="minor">
+            <a:schemeClr val="tx1"/>
+          </a:fontRef>
+        </p:style>
+      </p:cxnSp>
+      <p:sp>
+        <p:nvSpPr>
+          <p:cNvPr id="18" name="TextBox 17"/>
+          <p:cNvSpPr txBox="1"/>
+          <p:nvPr/>
+        </p:nvSpPr>
+        <p:spPr>
+          <a:xfrm>
+            <a:off x="300365" y="5021407"/>
+            <a:ext cx="1710725" cy="646331"/>
+          </a:xfrm>
+          <a:prstGeom prst="rect">
+            <a:avLst/>
+          </a:prstGeom>
+          <a:solidFill>
+            <a:srgbClr val="FFFFFF"/>
+          </a:solidFill>
+        </p:spPr>
+        <p:txBody>
+          <a:bodyPr wrap="none" rtlCol="0">
+            <a:spAutoFit/>
+          </a:bodyPr>
+          <a:lstStyle/>
+          <a:p>
+            <a:r>
+              <a:rPr lang="en-US" dirty="0" err="1">
+                <a:solidFill>
+                  <a:srgbClr val="FF0000"/>
+                </a:solidFill>
+              </a:rPr>
+              <a:t>Z</a:t>
+            </a:r>
+            <a:r>
+              <a:rPr lang="en-US" baseline="-25000" dirty="0" err="1" smtClean="0">
+                <a:solidFill>
+                  <a:srgbClr val="FF0000"/>
+                </a:solidFill>
+              </a:rPr>
+              <a:t>in</a:t>
+            </a:r>
+            <a:r>
+              <a:rPr lang="en-US" dirty="0" smtClean="0">
+                <a:solidFill>
+                  <a:srgbClr val="FF0000"/>
+                </a:solidFill>
+              </a:rPr>
+              <a:t> </a:t>
+            </a:r>
+            <a:r>
+              <a:rPr lang="en-US" dirty="0" smtClean="0">
+                <a:solidFill>
+                  <a:srgbClr val="FF0000"/>
+                </a:solidFill>
+              </a:rPr>
+              <a:t>= </a:t>
+            </a:r>
+            <a:r>
+              <a:rPr lang="en-US" dirty="0" smtClean="0">
+                <a:solidFill>
+                  <a:srgbClr val="FF0000"/>
+                </a:solidFill>
+              </a:rPr>
+              <a:t>Z</a:t>
+            </a:r>
+            <a:r>
+              <a:rPr lang="en-US" baseline="-25000" dirty="0" smtClean="0">
+                <a:solidFill>
+                  <a:srgbClr val="FF0000"/>
+                </a:solidFill>
+              </a:rPr>
+              <a:t>0</a:t>
+            </a:r>
+            <a:r>
+              <a:rPr lang="en-US" dirty="0" smtClean="0">
+                <a:solidFill>
+                  <a:srgbClr val="FF0000"/>
+                </a:solidFill>
+              </a:rPr>
+              <a:t>z</a:t>
+            </a:r>
+            <a:r>
+              <a:rPr lang="en-US" baseline="-25000" dirty="0" smtClean="0">
+                <a:solidFill>
+                  <a:srgbClr val="FF0000"/>
+                </a:solidFill>
+              </a:rPr>
+              <a:t>in</a:t>
+            </a:r>
+          </a:p>
+          <a:p>
+            <a:r>
+              <a:rPr lang="en-US" dirty="0" smtClean="0">
+                <a:solidFill>
+                  <a:srgbClr val="FF0000"/>
+                </a:solidFill>
+              </a:rPr>
+              <a:t>     = 15 </a:t>
+            </a:r>
+            <a:r>
+              <a:rPr lang="en-US" dirty="0">
+                <a:solidFill>
+                  <a:srgbClr val="FF0000"/>
+                </a:solidFill>
+              </a:rPr>
+              <a:t>-</a:t>
+            </a:r>
+            <a:r>
+              <a:rPr lang="en-US" dirty="0" smtClean="0">
+                <a:solidFill>
+                  <a:srgbClr val="FF0000"/>
+                </a:solidFill>
+              </a:rPr>
+              <a:t> j0.25 </a:t>
+            </a:r>
+            <a:r>
+              <a:rPr lang="en-US" dirty="0" smtClean="0">
+                <a:solidFill>
+                  <a:srgbClr val="FF0000"/>
+                </a:solidFill>
+                <a:latin typeface="Symbol" charset="2"/>
+                <a:cs typeface="Symbol" charset="2"/>
+              </a:rPr>
+              <a:t>W</a:t>
+            </a:r>
+            <a:endParaRPr lang="en-US" dirty="0">
+              <a:solidFill>
+                <a:srgbClr val="FF0000"/>
+              </a:solidFill>
+              <a:latin typeface="Symbol" charset="2"/>
+              <a:cs typeface="Symbol" charset="2"/>
+            </a:endParaRPr>
+          </a:p>
+        </p:txBody>
+      </p:sp>
+      <p:sp>
+        <p:nvSpPr>
+          <p:cNvPr id="20" name="TextBox 19"/>
+          <p:cNvSpPr txBox="1"/>
+          <p:nvPr/>
+        </p:nvSpPr>
+        <p:spPr>
+          <a:xfrm>
+            <a:off x="6415090" y="3601296"/>
+            <a:ext cx="1263988" cy="369332"/>
+          </a:xfrm>
+          <a:prstGeom prst="rect">
+            <a:avLst/>
+          </a:prstGeom>
+          <a:solidFill>
+            <a:srgbClr val="FFFFFF"/>
+          </a:solidFill>
+        </p:spPr>
+        <p:txBody>
+          <a:bodyPr wrap="none" rtlCol="0">
+            <a:spAutoFit/>
+          </a:bodyPr>
+          <a:lstStyle/>
+          <a:p>
+            <a:r>
+              <a:rPr lang="en-US" dirty="0" smtClean="0">
+                <a:solidFill>
+                  <a:srgbClr val="FF0000"/>
+                </a:solidFill>
+              </a:rPr>
+              <a:t>VSWR = 3.5</a:t>
+            </a:r>
+            <a:endParaRPr lang="en-US" dirty="0">
+              <a:solidFill>
+                <a:srgbClr val="FF0000"/>
+              </a:solidFill>
+            </a:endParaRPr>
+          </a:p>
+        </p:txBody>
+      </p:sp>
+      <p:sp>
+        <p:nvSpPr>
+          <p:cNvPr id="21" name="Oval 20"/>
+          <p:cNvSpPr/>
+          <p:nvPr/>
+        </p:nvSpPr>
+        <p:spPr>
+          <a:xfrm>
+            <a:off x="6304753" y="3433304"/>
+            <a:ext cx="88122" cy="88122"/>
+          </a:xfrm>
+          <a:prstGeom prst="ellipse">
+            <a:avLst/>
+          </a:prstGeom>
+          <a:solidFill>
+            <a:srgbClr val="FF0000"/>
+          </a:solidFill>
+          <a:ln>
+            <a:solidFill>
+              <a:schemeClr val="tx1"/>
+            </a:solidFill>
+          </a:ln>
+          <a:effectLst/>
+        </p:spPr>
+        <p:style>
+          <a:lnRef idx="1">
+            <a:schemeClr val="accent1"/>
+          </a:lnRef>
+          <a:fillRef idx="3">
+            <a:schemeClr val="accent1"/>
+          </a:fillRef>
+          <a:effectRef idx="2">
+            <a:schemeClr val="accent1"/>
+          </a:effectRef>
+          <a:fontRef idx="minor">
+            <a:schemeClr val="lt1"/>
+          </a:fontRef>
+        </p:style>
+        <p:txBody>
+          <a:bodyPr rtlCol="0" anchor="ctr"/>
+          <a:lstStyle/>
+          <a:p>
+            <a:pPr algn="ctr"/>
+            <a:endParaRPr lang="en-US"/>
+          </a:p>
+        </p:txBody>
+      </p:sp>
+      <p:cxnSp>
+        <p:nvCxnSpPr>
+          <p:cNvPr id="25" name="Straight Connector 24"/>
+          <p:cNvCxnSpPr/>
+          <p:nvPr/>
+        </p:nvCxnSpPr>
+        <p:spPr>
+          <a:xfrm flipH="1">
+            <a:off x="4778999" y="3495178"/>
+            <a:ext cx="3804825" cy="0"/>
+          </a:xfrm>
+          <a:prstGeom prst="line">
+            <a:avLst/>
+          </a:prstGeom>
+          <a:ln>
+            <a:solidFill>
+              <a:srgbClr val="FF0000"/>
+            </a:solidFill>
+            <a:prstDash val="sysDash"/>
+          </a:ln>
+          <a:effectLst/>
+        </p:spPr>
+        <p:style>
+          <a:lnRef idx="2">
+            <a:schemeClr val="accent1"/>
+          </a:lnRef>
+          <a:fillRef idx="0">
+            <a:schemeClr val="accent1"/>
+          </a:fillRef>
+          <a:effectRef idx="1">
+            <a:schemeClr val="accent1"/>
+          </a:effectRef>
+          <a:fontRef idx="minor">
+            <a:schemeClr val="tx1"/>
+          </a:fontRef>
+        </p:style>
+      </p:cxnSp>
+      <p:sp>
+        <p:nvSpPr>
+          <p:cNvPr id="29" name="Arc 28"/>
+          <p:cNvSpPr/>
+          <p:nvPr/>
+        </p:nvSpPr>
+        <p:spPr>
+          <a:xfrm>
+            <a:off x="1303096" y="82115"/>
+            <a:ext cx="7014312" cy="6855257"/>
+          </a:xfrm>
+          <a:prstGeom prst="arc">
+            <a:avLst>
+              <a:gd name="adj1" fmla="val 15943104"/>
+              <a:gd name="adj2" fmla="val 0"/>
+            </a:avLst>
+          </a:prstGeom>
+          <a:ln w="12700" cmpd="sng">
+            <a:solidFill>
+              <a:srgbClr val="FF0000"/>
+            </a:solidFill>
+            <a:prstDash val="sysDash"/>
+            <a:headEnd type="none"/>
+            <a:tailEnd type="triangle"/>
+          </a:ln>
+          <a:effectLst/>
+        </p:spPr>
+        <p:style>
+          <a:lnRef idx="2">
+            <a:schemeClr val="accent1"/>
+          </a:lnRef>
+          <a:fillRef idx="0">
+            <a:schemeClr val="accent1"/>
+          </a:fillRef>
+          <a:effectRef idx="1">
+            <a:schemeClr val="accent1"/>
+          </a:effectRef>
+          <a:fontRef idx="minor">
+            <a:schemeClr val="tx1"/>
+          </a:fontRef>
+        </p:style>
+        <p:txBody>
+          <a:bodyPr rtlCol="0" anchor="ctr"/>
+          <a:lstStyle/>
+          <a:p>
+            <a:pPr algn="ctr"/>
+            <a:endParaRPr lang="en-US"/>
+          </a:p>
+        </p:txBody>
+      </p:sp>
+      <p:sp>
+        <p:nvSpPr>
+          <p:cNvPr id="30" name="TextBox 29"/>
+          <p:cNvSpPr txBox="1"/>
+          <p:nvPr/>
+        </p:nvSpPr>
+        <p:spPr>
+          <a:xfrm>
+            <a:off x="7612056" y="394585"/>
+            <a:ext cx="847295" cy="923330"/>
+          </a:xfrm>
+          <a:prstGeom prst="rect">
+            <a:avLst/>
+          </a:prstGeom>
+          <a:solidFill>
+            <a:srgbClr val="FFFFFF"/>
+          </a:solidFill>
+        </p:spPr>
+        <p:txBody>
+          <a:bodyPr wrap="none" rtlCol="0">
+            <a:spAutoFit/>
+          </a:bodyPr>
+          <a:lstStyle/>
+          <a:p>
+            <a:r>
+              <a:rPr lang="en-US" dirty="0" smtClean="0">
+                <a:solidFill>
+                  <a:srgbClr val="FF0000"/>
+                </a:solidFill>
+              </a:rPr>
+              <a:t>  0.25</a:t>
+            </a:r>
+            <a:r>
+              <a:rPr lang="en-US" dirty="0" smtClean="0">
+                <a:solidFill>
+                  <a:srgbClr val="FF0000"/>
+                </a:solidFill>
+                <a:latin typeface="Symbol" charset="2"/>
+                <a:cs typeface="Symbol" charset="2"/>
+              </a:rPr>
+              <a:t>l</a:t>
+            </a:r>
+          </a:p>
+          <a:p>
+            <a:r>
+              <a:rPr lang="en-US" dirty="0" smtClean="0">
+                <a:solidFill>
+                  <a:srgbClr val="FF0000"/>
+                </a:solidFill>
+              </a:rPr>
+              <a:t>+0.12</a:t>
+            </a:r>
+            <a:r>
+              <a:rPr lang="en-US" dirty="0" smtClean="0">
+                <a:solidFill>
+                  <a:srgbClr val="FF0000"/>
+                </a:solidFill>
+                <a:latin typeface="Symbol" charset="2"/>
+                <a:cs typeface="Symbol" charset="2"/>
+              </a:rPr>
+              <a:t>l</a:t>
+            </a:r>
+          </a:p>
+          <a:p>
+            <a:r>
+              <a:rPr lang="en-US" dirty="0" smtClean="0">
+                <a:solidFill>
+                  <a:srgbClr val="FF0000"/>
+                </a:solidFill>
+                <a:latin typeface="Symbol" charset="2"/>
+                <a:cs typeface="Symbol" charset="2"/>
+              </a:rPr>
+              <a:t>=</a:t>
+            </a:r>
+            <a:r>
+              <a:rPr lang="en-US" dirty="0" smtClean="0">
+                <a:solidFill>
+                  <a:srgbClr val="FF0000"/>
+                </a:solidFill>
+              </a:rPr>
+              <a:t>0.13</a:t>
+            </a:r>
+            <a:r>
+              <a:rPr lang="en-US" dirty="0" smtClean="0">
+                <a:solidFill>
+                  <a:srgbClr val="FF0000"/>
+                </a:solidFill>
+                <a:latin typeface="Symbol" charset="2"/>
+                <a:cs typeface="Symbol" charset="2"/>
+              </a:rPr>
+              <a:t>l</a:t>
+            </a:r>
+            <a:endParaRPr lang="en-US" dirty="0">
+              <a:solidFill>
+                <a:srgbClr val="FF0000"/>
+              </a:solidFill>
+            </a:endParaRPr>
+          </a:p>
+        </p:txBody>
+      </p:sp>
+      <p:cxnSp>
+        <p:nvCxnSpPr>
+          <p:cNvPr id="31" name="Straight Connector 30"/>
+          <p:cNvCxnSpPr/>
+          <p:nvPr/>
+        </p:nvCxnSpPr>
+        <p:spPr>
+          <a:xfrm>
+            <a:off x="7679078" y="1014904"/>
+            <a:ext cx="767305" cy="0"/>
+          </a:xfrm>
+          <a:prstGeom prst="line">
+            <a:avLst/>
+          </a:prstGeom>
+          <a:ln>
+            <a:solidFill>
+              <a:srgbClr val="FF0000"/>
+            </a:solidFill>
+          </a:ln>
+          <a:effectLst/>
+        </p:spPr>
+        <p:style>
+          <a:lnRef idx="2">
+            <a:schemeClr val="accent1"/>
+          </a:lnRef>
+          <a:fillRef idx="0">
+            <a:schemeClr val="accent1"/>
+          </a:fillRef>
+          <a:effectRef idx="1">
+            <a:schemeClr val="accent1"/>
+          </a:effectRef>
+          <a:fontRef idx="minor">
+            <a:schemeClr val="tx1"/>
+          </a:fontRef>
+        </p:style>
+      </p:cxnSp>
+      <p:sp>
+        <p:nvSpPr>
+          <p:cNvPr id="32" name="TextBox 31"/>
+          <p:cNvSpPr txBox="1"/>
+          <p:nvPr/>
+        </p:nvSpPr>
+        <p:spPr>
+          <a:xfrm>
+            <a:off x="6585441" y="5393"/>
+            <a:ext cx="2053229" cy="523220"/>
+          </a:xfrm>
+          <a:prstGeom prst="rect">
+            <a:avLst/>
+          </a:prstGeom>
+          <a:noFill/>
+        </p:spPr>
+        <p:txBody>
+          <a:bodyPr wrap="none" rtlCol="0">
+            <a:spAutoFit/>
+          </a:bodyPr>
+          <a:lstStyle/>
+          <a:p>
+            <a:r>
+              <a:rPr lang="en-US" sz="1400" dirty="0" smtClean="0">
+                <a:solidFill>
+                  <a:srgbClr val="FF0000"/>
+                </a:solidFill>
+              </a:rPr>
+              <a:t>Distance to first voltage</a:t>
+            </a:r>
+          </a:p>
+          <a:p>
+            <a:r>
+              <a:rPr lang="en-US" sz="1400" dirty="0">
+                <a:solidFill>
+                  <a:srgbClr val="FF0000"/>
+                </a:solidFill>
+              </a:rPr>
+              <a:t>s</a:t>
+            </a:r>
+            <a:r>
+              <a:rPr lang="en-US" sz="1400" dirty="0" smtClean="0">
+                <a:solidFill>
+                  <a:srgbClr val="FF0000"/>
+                </a:solidFill>
+              </a:rPr>
+              <a:t>tanding wave maximum:</a:t>
+            </a:r>
+            <a:endParaRPr lang="en-US" sz="1400" dirty="0">
+              <a:solidFill>
+                <a:srgbClr val="FF0000"/>
+              </a:solidFill>
+            </a:endParaRPr>
+          </a:p>
+        </p:txBody>
+      </p:sp>
+    </p:spTree>
+    <p:extLst>
+      <p:ext uri="{BB962C8B-B14F-4D97-AF65-F5344CB8AC3E}">
+        <p14:creationId xmlns:p14="http://schemas.microsoft.com/office/powerpoint/2010/main" val="593265578"/>
       </p:ext>
     </p:extLst>
   </p:cSld>

</xml_diff>